<commit_message>
Updating Final Project Files
</commit_message>
<xml_diff>
--- a/Presentations/Final Project/Car Rental System.pptx
+++ b/Presentations/Final Project/Car Rental System.pptx
@@ -7819,7 +7819,7 @@
       </p:grpSpPr>
       <p:pic>
         <p:nvPicPr>
-          <p:cNvPr id="2" name="Picture 1"/>
+          <p:cNvPr id="3" name="Picture 2"/>
           <p:cNvPicPr>
             <a:picLocks noChangeAspect="1"/>
           </p:cNvPicPr>
@@ -7839,8 +7839,8 @@
         </p:blipFill>
         <p:spPr>
           <a:xfrm>
-            <a:off x="3023616" y="1107488"/>
-            <a:ext cx="8639088" cy="4753453"/>
+            <a:off x="2511552" y="940950"/>
+            <a:ext cx="9163344" cy="5041912"/>
           </a:xfrm>
           <a:prstGeom prst="round2DiagRect">
             <a:avLst>
@@ -7938,21 +7938,13 @@
           <a:p>
             <a:r>
               <a:rPr lang="en-US" dirty="0" smtClean="0"/>
-              <a:t>Car </a:t>
-            </a:r>
+              <a:t>Car Service</a:t>
+            </a:r>
+          </a:p>
+          <a:p>
             <a:r>
               <a:rPr lang="en-US" dirty="0" smtClean="0"/>
-              <a:t>Service</a:t>
-            </a:r>
-          </a:p>
-          <a:p>
-            <a:r>
-              <a:rPr lang="en-US" dirty="0" smtClean="0"/>
-              <a:t>Customer </a:t>
-            </a:r>
-            <a:r>
-              <a:rPr lang="en-US" dirty="0" smtClean="0"/>
-              <a:t>Service</a:t>
+              <a:t>Customer Service</a:t>
             </a:r>
           </a:p>
           <a:p>

</xml_diff>